<commit_message>
A few typos in Module 3 lecture.
</commit_message>
<xml_diff>
--- a/LectureFiles/cshl/2015/RNASeq_Module3_Lecture.pptx
+++ b/LectureFiles/cshl/2015/RNASeq_Module3_Lecture.pptx
@@ -266,7 +266,7 @@
               <a:pPr>
                 <a:defRPr/>
               </a:pPr>
-              <a:t>11/14/15</a:t>
+              <a:t>11/16/15</a:t>
             </a:fld>
             <a:endParaRPr lang="en-US"/>
           </a:p>
@@ -473,7 +473,7 @@
               <a:pPr>
                 <a:defRPr/>
               </a:pPr>
-              <a:t>11/14/15</a:t>
+              <a:t>11/16/15</a:t>
             </a:fld>
             <a:endParaRPr lang="en-US"/>
           </a:p>
@@ -3376,7 +3376,7 @@
               <a:pPr>
                 <a:defRPr/>
               </a:pPr>
-              <a:t>11/14/15</a:t>
+              <a:t>11/16/15</a:t>
             </a:fld>
             <a:endParaRPr lang="en-US"/>
           </a:p>
@@ -5763,49 +5763,35 @@
               <a:t>Genes, transcripts, exons, </a:t>
             </a:r>
             <a:r>
+              <a:rPr lang="en-US" dirty="0" smtClean="0">
+                <a:latin typeface="Calibri" charset="0"/>
+                <a:ea typeface="ＭＳ Ｐゴシック" charset="0"/>
+              </a:rPr>
+              <a:t>junctions</a:t>
+            </a:r>
+            <a:r>
+              <a:rPr lang="en-US" dirty="0" smtClean="0">
+                <a:latin typeface="Calibri" charset="0"/>
+                <a:ea typeface="ＭＳ Ｐゴシック" charset="0"/>
+              </a:rPr>
+              <a:t>, retained introns, microRNAs, </a:t>
+            </a:r>
+            <a:r>
               <a:rPr lang="en-US" dirty="0" err="1" smtClean="0">
                 <a:latin typeface="Calibri" charset="0"/>
                 <a:ea typeface="ＭＳ Ｐゴシック" charset="0"/>
               </a:rPr>
-              <a:t>juntions</a:t>
+              <a:t>lncRNAs</a:t>
             </a:r>
             <a:r>
               <a:rPr lang="en-US" dirty="0" smtClean="0">
                 <a:latin typeface="Calibri" charset="0"/>
                 <a:ea typeface="ＭＳ Ｐゴシック" charset="0"/>
               </a:rPr>
-              <a:t>, retained introns, microRNAs, </a:t>
-            </a:r>
-            <a:r>
-              <a:rPr lang="en-US" dirty="0" err="1" smtClean="0">
-                <a:latin typeface="Calibri" charset="0"/>
-                <a:ea typeface="ＭＳ Ｐゴシック" charset="0"/>
-              </a:rPr>
-              <a:t>lncRNAs</a:t>
-            </a:r>
-            <a:r>
-              <a:rPr lang="en-US" dirty="0" smtClean="0">
-                <a:latin typeface="Calibri" charset="0"/>
-                <a:ea typeface="ＭＳ Ｐゴシック" charset="0"/>
-              </a:rPr>
               <a:t>, </a:t>
             </a:r>
             <a:r>
-              <a:rPr lang="en-US" dirty="0" err="1" smtClean="0">
-                <a:latin typeface="Calibri" charset="0"/>
-                <a:ea typeface="ＭＳ Ｐゴシック" charset="0"/>
-              </a:rPr>
-              <a:t>etc</a:t>
-            </a:r>
-            <a:r>
-              <a:rPr lang="en-US" dirty="0" smtClean="0">
-                <a:latin typeface="Calibri" charset="0"/>
-                <a:ea typeface="ＭＳ Ｐゴシック" charset="0"/>
-              </a:rPr>
-              <a:t>, </a:t>
-            </a:r>
-            <a:r>
-              <a:rPr lang="en-US" dirty="0" err="1" smtClean="0">
+              <a:rPr lang="en-US" smtClean="0">
                 <a:latin typeface="Calibri" charset="0"/>
                 <a:ea typeface="ＭＳ Ｐゴシック" charset="0"/>
               </a:rPr>
@@ -6770,16 +6756,6 @@
               </a:rPr>
               <a:t>3</a:t>
             </a:r>
-            <a:r>
-              <a:rPr lang="en-US" sz="2000" dirty="0">
-                <a:solidFill>
-                  <a:schemeClr val="bg1"/>
-                </a:solidFill>
-                <a:latin typeface="Calibri" charset="0"/>
-                <a:cs typeface="Segoe UI" charset="0"/>
-              </a:rPr>
-              <a:t/>
-            </a:r>
             <a:br>
               <a:rPr lang="en-US" sz="2000" dirty="0">
                 <a:solidFill>
@@ -6797,17 +6773,7 @@
                 <a:latin typeface="Calibri" charset="0"/>
                 <a:cs typeface="Segoe UI" charset="0"/>
               </a:rPr>
-              <a:t>Expression and Differential Expression</a:t>
-            </a:r>
-            <a:r>
-              <a:rPr lang="en-US" sz="2000" dirty="0" smtClean="0">
-                <a:solidFill>
-                  <a:schemeClr val="bg1"/>
-                </a:solidFill>
-                <a:latin typeface="Calibri" charset="0"/>
-                <a:cs typeface="Segoe UI" charset="0"/>
-              </a:rPr>
-              <a:t> </a:t>
+              <a:t>Expression and Differential Expression </a:t>
             </a:r>
             <a:r>
               <a:rPr lang="en-US" sz="2000" dirty="0">
@@ -9666,11 +9632,7 @@
             </a:pPr>
             <a:r>
               <a:rPr lang="en-US" dirty="0" smtClean="0"/>
-              <a:t>Module </a:t>
-            </a:r>
-            <a:r>
-              <a:rPr lang="en-US" dirty="0" smtClean="0"/>
-              <a:t>1: </a:t>
+              <a:t>Module 1: </a:t>
             </a:r>
             <a:r>
               <a:rPr lang="en-US" dirty="0"/>
@@ -9692,11 +9654,7 @@
             </a:r>
             <a:r>
               <a:rPr lang="en-US" dirty="0" smtClean="0"/>
-              <a:t>2: </a:t>
-            </a:r>
-            <a:r>
-              <a:rPr lang="en-US" dirty="0" smtClean="0"/>
-              <a:t>Alignment </a:t>
+              <a:t>2: Alignment </a:t>
             </a:r>
             <a:r>
               <a:rPr lang="en-US" dirty="0"/>
@@ -9739,11 +9697,7 @@
             </a:r>
             <a:r>
               <a:rPr lang="en-US" dirty="0"/>
-              <a:t>Isoform </a:t>
-            </a:r>
-            <a:r>
-              <a:rPr lang="en-US" dirty="0"/>
-              <a:t>D</a:t>
+              <a:t>Isoform D</a:t>
             </a:r>
             <a:r>
               <a:rPr lang="en-US" dirty="0" smtClean="0"/>

</xml_diff>